<commit_message>
Update 24 & 43
</commit_message>
<xml_diff>
--- a/24罪人認罪.pptx
+++ b/24罪人認罪.pptx
@@ -308,7 +308,7 @@
             <a:fld id="{86B5546F-C09B-4E63-ABC5-F7C86A7E8D66}" type="datetimeFigureOut">
               <a:rPr lang="en-US" smtClean="0"/>
               <a:pPr/>
-              <a:t>7/16/2020</a:t>
+              <a:t>9/21/2021</a:t>
             </a:fld>
             <a:endParaRPr lang="en-US"/>
           </a:p>
@@ -480,7 +480,7 @@
             <a:fld id="{86B5546F-C09B-4E63-ABC5-F7C86A7E8D66}" type="datetimeFigureOut">
               <a:rPr lang="en-US" smtClean="0"/>
               <a:pPr/>
-              <a:t>7/16/2020</a:t>
+              <a:t>9/21/2021</a:t>
             </a:fld>
             <a:endParaRPr lang="en-US"/>
           </a:p>
@@ -662,7 +662,7 @@
             <a:fld id="{86B5546F-C09B-4E63-ABC5-F7C86A7E8D66}" type="datetimeFigureOut">
               <a:rPr lang="en-US" smtClean="0"/>
               <a:pPr/>
-              <a:t>7/16/2020</a:t>
+              <a:t>9/21/2021</a:t>
             </a:fld>
             <a:endParaRPr lang="en-US"/>
           </a:p>
@@ -834,7 +834,7 @@
             <a:fld id="{86B5546F-C09B-4E63-ABC5-F7C86A7E8D66}" type="datetimeFigureOut">
               <a:rPr lang="en-US" smtClean="0"/>
               <a:pPr/>
-              <a:t>7/16/2020</a:t>
+              <a:t>9/21/2021</a:t>
             </a:fld>
             <a:endParaRPr lang="en-US"/>
           </a:p>
@@ -1082,7 +1082,7 @@
             <a:fld id="{86B5546F-C09B-4E63-ABC5-F7C86A7E8D66}" type="datetimeFigureOut">
               <a:rPr lang="en-US" smtClean="0"/>
               <a:pPr/>
-              <a:t>7/16/2020</a:t>
+              <a:t>9/21/2021</a:t>
             </a:fld>
             <a:endParaRPr lang="en-US"/>
           </a:p>
@@ -1372,7 +1372,7 @@
             <a:fld id="{86B5546F-C09B-4E63-ABC5-F7C86A7E8D66}" type="datetimeFigureOut">
               <a:rPr lang="en-US" smtClean="0"/>
               <a:pPr/>
-              <a:t>7/16/2020</a:t>
+              <a:t>9/21/2021</a:t>
             </a:fld>
             <a:endParaRPr lang="en-US"/>
           </a:p>
@@ -1796,7 +1796,7 @@
             <a:fld id="{86B5546F-C09B-4E63-ABC5-F7C86A7E8D66}" type="datetimeFigureOut">
               <a:rPr lang="en-US" smtClean="0"/>
               <a:pPr/>
-              <a:t>7/16/2020</a:t>
+              <a:t>9/21/2021</a:t>
             </a:fld>
             <a:endParaRPr lang="en-US"/>
           </a:p>
@@ -1916,7 +1916,7 @@
             <a:fld id="{86B5546F-C09B-4E63-ABC5-F7C86A7E8D66}" type="datetimeFigureOut">
               <a:rPr lang="en-US" smtClean="0"/>
               <a:pPr/>
-              <a:t>7/16/2020</a:t>
+              <a:t>9/21/2021</a:t>
             </a:fld>
             <a:endParaRPr lang="en-US"/>
           </a:p>
@@ -2013,7 +2013,7 @@
             <a:fld id="{86B5546F-C09B-4E63-ABC5-F7C86A7E8D66}" type="datetimeFigureOut">
               <a:rPr lang="en-US" smtClean="0"/>
               <a:pPr/>
-              <a:t>7/16/2020</a:t>
+              <a:t>9/21/2021</a:t>
             </a:fld>
             <a:endParaRPr lang="en-US"/>
           </a:p>
@@ -2292,7 +2292,7 @@
             <a:fld id="{86B5546F-C09B-4E63-ABC5-F7C86A7E8D66}" type="datetimeFigureOut">
               <a:rPr lang="en-US" smtClean="0"/>
               <a:pPr/>
-              <a:t>7/16/2020</a:t>
+              <a:t>9/21/2021</a:t>
             </a:fld>
             <a:endParaRPr lang="en-US"/>
           </a:p>
@@ -2551,7 +2551,7 @@
             <a:fld id="{86B5546F-C09B-4E63-ABC5-F7C86A7E8D66}" type="datetimeFigureOut">
               <a:rPr lang="en-US" smtClean="0"/>
               <a:pPr/>
-              <a:t>7/16/2020</a:t>
+              <a:t>9/21/2021</a:t>
             </a:fld>
             <a:endParaRPr lang="en-US"/>
           </a:p>
@@ -2771,7 +2771,7 @@
             <a:fld id="{86B5546F-C09B-4E63-ABC5-F7C86A7E8D66}" type="datetimeFigureOut">
               <a:rPr lang="en-US" smtClean="0"/>
               <a:pPr/>
-              <a:t>7/16/2020</a:t>
+              <a:t>9/21/2021</a:t>
             </a:fld>
             <a:endParaRPr lang="en-US"/>
           </a:p>
@@ -3164,6 +3164,23 @@
           </a:bodyPr>
           <a:lstStyle/>
           <a:p>
+            <a:r>
+              <a:rPr lang="zh-CN" altLang="en-US" sz="9600" b="1" dirty="0">
+                <a:solidFill>
+                  <a:srgbClr val="660033"/>
+                </a:solidFill>
+                <a:effectLst>
+                  <a:outerShdw blurRad="38100" dist="38100" dir="2700000" algn="tl">
+                    <a:srgbClr val="000000">
+                      <a:alpha val="43137"/>
+                    </a:srgbClr>
+                  </a:outerShdw>
+                </a:effectLst>
+                <a:latin typeface="Microsoft JhengHei" panose="020B0604030504040204" pitchFamily="34" charset="-120"/>
+                <a:ea typeface="Microsoft JhengHei" panose="020B0604030504040204" pitchFamily="34" charset="-120"/>
+              </a:rPr>
+              <a:t>罪人認罪</a:t>
+            </a:r>
             <a:endParaRPr lang="en-US" sz="9600" b="1" dirty="0">
               <a:solidFill>
                 <a:srgbClr val="660033"/>
@@ -3175,8 +3192,8 @@
                   </a:srgbClr>
                 </a:outerShdw>
               </a:effectLst>
-              <a:latin typeface="微軟正黑體" pitchFamily="34" charset="-120"/>
-              <a:ea typeface="微軟正黑體" pitchFamily="34" charset="-120"/>
+              <a:latin typeface="Microsoft JhengHei" panose="020B0604030504040204" pitchFamily="34" charset="-120"/>
+              <a:ea typeface="Microsoft JhengHei" panose="020B0604030504040204" pitchFamily="34" charset="-120"/>
             </a:endParaRPr>
           </a:p>
         </p:txBody>
@@ -3586,37 +3603,7 @@
                 <a:latin typeface="微軟正黑體" pitchFamily="34" charset="-120"/>
                 <a:ea typeface="微軟正黑體" pitchFamily="34" charset="-120"/>
               </a:rPr>
-              <a:t>耶穌說</a:t>
-            </a:r>
-            <a:r>
-              <a:rPr lang="zh-TW" altLang="en-US" sz="6400" dirty="0">
-                <a:solidFill>
-                  <a:srgbClr val="660033"/>
-                </a:solidFill>
-                <a:latin typeface="微軟正黑體" pitchFamily="34" charset="-120"/>
-                <a:ea typeface="微軟正黑體" pitchFamily="34" charset="-120"/>
-              </a:rPr>
-              <a:t>：今</a:t>
-            </a:r>
-            <a:r>
-              <a:rPr lang="zh-TW" altLang="en-US" sz="6400" dirty="0">
-                <a:solidFill>
-                  <a:srgbClr val="660033"/>
-                </a:solidFill>
-                <a:latin typeface="微軟正黑體" pitchFamily="34" charset="-120"/>
-                <a:ea typeface="微軟正黑體" pitchFamily="34" charset="-120"/>
-              </a:rPr>
-              <a:t>天救恩到了這</a:t>
-            </a:r>
-            <a:r>
-              <a:rPr lang="zh-TW" altLang="en-US" sz="6400" dirty="0">
-                <a:solidFill>
-                  <a:srgbClr val="660033"/>
-                </a:solidFill>
-                <a:latin typeface="微軟正黑體" pitchFamily="34" charset="-120"/>
-                <a:ea typeface="微軟正黑體" pitchFamily="34" charset="-120"/>
-              </a:rPr>
-              <a:t>家</a:t>
+              <a:t>耶穌說：今天救恩到了這家</a:t>
             </a:r>
             <a:r>
               <a:rPr lang="zh-TW" altLang="en-US" sz="6400" dirty="0" smtClean="0">
@@ -3713,17 +3700,7 @@
                 <a:latin typeface="微軟正黑體" pitchFamily="34" charset="-120"/>
                 <a:ea typeface="微軟正黑體" pitchFamily="34" charset="-120"/>
               </a:rPr>
-              <a:t>說：主</a:t>
-            </a:r>
-            <a:r>
-              <a:rPr lang="zh-TW" altLang="en-US" sz="6400" b="1" dirty="0">
-                <a:solidFill>
-                  <a:srgbClr val="660033"/>
-                </a:solidFill>
-                <a:latin typeface="微軟正黑體" pitchFamily="34" charset="-120"/>
-                <a:ea typeface="微軟正黑體" pitchFamily="34" charset="-120"/>
-              </a:rPr>
-              <a:t>啊，沒有。</a:t>
+              <a:t>說：主啊，沒有。</a:t>
             </a:r>
             <a:endParaRPr lang="en-US" altLang="zh-TW" sz="6400" b="1" dirty="0">
               <a:solidFill>
@@ -3795,27 +3772,7 @@
                 <a:latin typeface="微軟正黑體" pitchFamily="34" charset="-120"/>
                 <a:ea typeface="微軟正黑體" pitchFamily="34" charset="-120"/>
               </a:rPr>
-              <a:t>耶穌說</a:t>
-            </a:r>
-            <a:r>
-              <a:rPr lang="zh-TW" altLang="en-US" sz="6400" dirty="0">
-                <a:solidFill>
-                  <a:srgbClr val="660033"/>
-                </a:solidFill>
-                <a:latin typeface="微軟正黑體" pitchFamily="34" charset="-120"/>
-                <a:ea typeface="微軟正黑體" pitchFamily="34" charset="-120"/>
-              </a:rPr>
-              <a:t>：我</a:t>
-            </a:r>
-            <a:r>
-              <a:rPr lang="zh-TW" altLang="en-US" sz="6400" dirty="0">
-                <a:solidFill>
-                  <a:srgbClr val="660033"/>
-                </a:solidFill>
-                <a:latin typeface="微軟正黑體" pitchFamily="34" charset="-120"/>
-                <a:ea typeface="微軟正黑體" pitchFamily="34" charset="-120"/>
-              </a:rPr>
-              <a:t>也不定你的罪。去吧，從此不</a:t>
+              <a:t>耶穌說：我也不定你的罪。去吧，從此不</a:t>
             </a:r>
             <a:r>
               <a:rPr lang="zh-TW" altLang="en-US" sz="6400" dirty="0" smtClean="0">
@@ -3864,27 +3821,7 @@
                 <a:latin typeface="微軟正黑體" pitchFamily="34" charset="-120"/>
                 <a:ea typeface="微軟正黑體" pitchFamily="34" charset="-120"/>
               </a:rPr>
-              <a:t>我告訴你們，一個罪人悔改，在天上也要這樣為他歡</a:t>
-            </a:r>
-            <a:r>
-              <a:rPr lang="zh-TW" altLang="en-US" sz="6400" b="1" dirty="0">
-                <a:solidFill>
-                  <a:srgbClr val="660033"/>
-                </a:solidFill>
-                <a:latin typeface="微軟正黑體" pitchFamily="34" charset="-120"/>
-                <a:ea typeface="微軟正黑體" pitchFamily="34" charset="-120"/>
-              </a:rPr>
-              <a:t>喜</a:t>
-            </a:r>
-            <a:r>
-              <a:rPr lang="zh-TW" altLang="en-US" sz="6400" b="1" dirty="0">
-                <a:solidFill>
-                  <a:srgbClr val="660033"/>
-                </a:solidFill>
-                <a:latin typeface="微軟正黑體" pitchFamily="34" charset="-120"/>
-                <a:ea typeface="微軟正黑體" pitchFamily="34" charset="-120"/>
-              </a:rPr>
-              <a:t>。</a:t>
+              <a:t>我告訴你們，一個罪人悔改，在天上也要這樣為他歡喜。</a:t>
             </a:r>
             <a:endParaRPr lang="en-US" altLang="zh-TW" sz="6400" dirty="0">
               <a:solidFill>

</xml_diff>